<commit_message>
Update presentation to add load balancer
</commit_message>
<xml_diff>
--- a/docs/Kubernetes-on-AWS-Presentation.pptx
+++ b/docs/Kubernetes-on-AWS-Presentation.pptx
@@ -204,7 +204,7 @@
             <a:fld id="{814910AB-AEF0-414C-82CB-791080B1186B}" type="datetimeFigureOut">
               <a:rPr lang="en-US" smtClean="0"/>
               <a:pPr/>
-              <a:t>9/3/2016</a:t>
+              <a:t>9/4/2016</a:t>
             </a:fld>
             <a:endParaRPr lang="en-US" dirty="0"/>
           </a:p>
@@ -366,7 +366,7 @@
             <a:fld id="{5B4AE38D-E020-46F3-803D-8636C5B7B74E}" type="datetimeFigureOut">
               <a:rPr lang="en-US" smtClean="0"/>
               <a:pPr/>
-              <a:t>9/3/2016</a:t>
+              <a:t>9/4/2016</a:t>
             </a:fld>
             <a:endParaRPr lang="en-US" dirty="0"/>
           </a:p>
@@ -939,7 +939,7 @@
             <a:fld id="{7DDB771E-4AED-4DD3-8AA1-5D9FD2224F14}" type="datetimeFigureOut">
               <a:rPr lang="en-US" smtClean="0"/>
               <a:pPr/>
-              <a:t>9/3/2016</a:t>
+              <a:t>9/4/2016</a:t>
             </a:fld>
             <a:endParaRPr lang="en-US" dirty="0"/>
           </a:p>
@@ -1106,7 +1106,7 @@
             <a:fld id="{7DDB771E-4AED-4DD3-8AA1-5D9FD2224F14}" type="datetimeFigureOut">
               <a:rPr lang="en-US" smtClean="0"/>
               <a:pPr/>
-              <a:t>9/3/2016</a:t>
+              <a:t>9/4/2016</a:t>
             </a:fld>
             <a:endParaRPr lang="en-US" dirty="0"/>
           </a:p>
@@ -1283,7 +1283,7 @@
             <a:fld id="{7DDB771E-4AED-4DD3-8AA1-5D9FD2224F14}" type="datetimeFigureOut">
               <a:rPr lang="en-US" smtClean="0"/>
               <a:pPr/>
-              <a:t>9/3/2016</a:t>
+              <a:t>9/4/2016</a:t>
             </a:fld>
             <a:endParaRPr lang="en-US" dirty="0"/>
           </a:p>
@@ -1450,7 +1450,7 @@
             <a:fld id="{7DDB771E-4AED-4DD3-8AA1-5D9FD2224F14}" type="datetimeFigureOut">
               <a:rPr lang="en-US" smtClean="0"/>
               <a:pPr/>
-              <a:t>9/3/2016</a:t>
+              <a:t>9/4/2016</a:t>
             </a:fld>
             <a:endParaRPr lang="en-US" dirty="0"/>
           </a:p>
@@ -1693,7 +1693,7 @@
             <a:fld id="{7DDB771E-4AED-4DD3-8AA1-5D9FD2224F14}" type="datetimeFigureOut">
               <a:rPr lang="en-US" smtClean="0"/>
               <a:pPr/>
-              <a:t>9/3/2016</a:t>
+              <a:t>9/4/2016</a:t>
             </a:fld>
             <a:endParaRPr lang="en-US" dirty="0"/>
           </a:p>
@@ -1978,7 +1978,7 @@
             <a:fld id="{7DDB771E-4AED-4DD3-8AA1-5D9FD2224F14}" type="datetimeFigureOut">
               <a:rPr lang="en-US" smtClean="0"/>
               <a:pPr/>
-              <a:t>9/3/2016</a:t>
+              <a:t>9/4/2016</a:t>
             </a:fld>
             <a:endParaRPr lang="en-US" dirty="0"/>
           </a:p>
@@ -2397,7 +2397,7 @@
             <a:fld id="{7DDB771E-4AED-4DD3-8AA1-5D9FD2224F14}" type="datetimeFigureOut">
               <a:rPr lang="en-US" smtClean="0"/>
               <a:pPr/>
-              <a:t>9/3/2016</a:t>
+              <a:t>9/4/2016</a:t>
             </a:fld>
             <a:endParaRPr lang="en-US" dirty="0"/>
           </a:p>
@@ -2512,7 +2512,7 @@
             <a:fld id="{7DDB771E-4AED-4DD3-8AA1-5D9FD2224F14}" type="datetimeFigureOut">
               <a:rPr lang="en-US" smtClean="0"/>
               <a:pPr/>
-              <a:t>9/3/2016</a:t>
+              <a:t>9/4/2016</a:t>
             </a:fld>
             <a:endParaRPr lang="en-US" dirty="0"/>
           </a:p>
@@ -2604,7 +2604,7 @@
             <a:fld id="{7DDB771E-4AED-4DD3-8AA1-5D9FD2224F14}" type="datetimeFigureOut">
               <a:rPr lang="en-US" smtClean="0"/>
               <a:pPr/>
-              <a:t>9/3/2016</a:t>
+              <a:t>9/4/2016</a:t>
             </a:fld>
             <a:endParaRPr lang="en-US" dirty="0"/>
           </a:p>
@@ -2878,7 +2878,7 @@
             <a:fld id="{7DDB771E-4AED-4DD3-8AA1-5D9FD2224F14}" type="datetimeFigureOut">
               <a:rPr lang="en-US" smtClean="0"/>
               <a:pPr/>
-              <a:t>9/3/2016</a:t>
+              <a:t>9/4/2016</a:t>
             </a:fld>
             <a:endParaRPr lang="en-US" dirty="0"/>
           </a:p>
@@ -3128,7 +3128,7 @@
             <a:fld id="{7DDB771E-4AED-4DD3-8AA1-5D9FD2224F14}" type="datetimeFigureOut">
               <a:rPr lang="en-US" smtClean="0"/>
               <a:pPr/>
-              <a:t>9/3/2016</a:t>
+              <a:t>9/4/2016</a:t>
             </a:fld>
             <a:endParaRPr lang="en-US" dirty="0"/>
           </a:p>
@@ -3338,7 +3338,7 @@
             <a:fld id="{7DDB771E-4AED-4DD3-8AA1-5D9FD2224F14}" type="datetimeFigureOut">
               <a:rPr lang="en-US" smtClean="0"/>
               <a:pPr/>
-              <a:t>9/3/2016</a:t>
+              <a:t>9/4/2016</a:t>
             </a:fld>
             <a:endParaRPr lang="en-US" dirty="0"/>
           </a:p>
@@ -3966,13 +3966,8 @@
             </a:pPr>
             <a:r>
               <a:rPr lang="en-US" dirty="0" smtClean="0"/>
-              <a:t> Learn Kubernetes and Kubernetes </a:t>
-            </a:r>
-            <a:r>
-              <a:rPr lang="en-US" dirty="0" smtClean="0"/>
-              <a:t>Orchestration</a:t>
-            </a:r>
-            <a:endParaRPr lang="en-US" dirty="0" smtClean="0"/>
+              <a:t> Learn Kubernetes and Kubernetes Orchestration</a:t>
+            </a:r>
           </a:p>
         </p:txBody>
       </p:sp>
@@ -4093,11 +4088,7 @@
             </a:r>
             <a:r>
               <a:rPr lang="en-US" dirty="0" smtClean="0"/>
-              <a:t> so you can </a:t>
-            </a:r>
-            <a:r>
-              <a:rPr lang="en-US" dirty="0" smtClean="0"/>
-              <a:t>learn and evaluate</a:t>
+              <a:t> so you can learn and evaluate</a:t>
             </a:r>
           </a:p>
           <a:p>
@@ -4328,7 +4319,7 @@
         </p:nvSpPr>
         <p:spPr>
           <a:xfrm>
-            <a:off x="2195051" y="3101855"/>
+            <a:off x="2195051" y="3269635"/>
             <a:ext cx="5561704" cy="3119718"/>
           </a:xfrm>
           <a:prstGeom prst="rect">
@@ -4371,7 +4362,7 @@
         </p:nvSpPr>
         <p:spPr>
           <a:xfrm>
-            <a:off x="751918" y="3984772"/>
+            <a:off x="751918" y="4152552"/>
             <a:ext cx="1295400" cy="1981200"/>
           </a:xfrm>
           <a:prstGeom prst="rect">
@@ -4472,7 +4463,7 @@
         </p:nvSpPr>
         <p:spPr>
           <a:xfrm>
-            <a:off x="2501465" y="3976383"/>
+            <a:off x="2501465" y="4144163"/>
             <a:ext cx="1161759" cy="1981200"/>
           </a:xfrm>
           <a:prstGeom prst="rect">
@@ -4515,7 +4506,7 @@
         </p:nvSpPr>
         <p:spPr>
           <a:xfrm>
-            <a:off x="775373" y="3607051"/>
+            <a:off x="775373" y="3774831"/>
             <a:ext cx="1285608" cy="369332"/>
           </a:xfrm>
           <a:prstGeom prst="rect">
@@ -4545,7 +4536,7 @@
         </p:nvSpPr>
         <p:spPr>
           <a:xfrm>
-            <a:off x="2448451" y="3607051"/>
+            <a:off x="2448451" y="3774831"/>
             <a:ext cx="1218347" cy="369332"/>
           </a:xfrm>
           <a:prstGeom prst="rect">
@@ -4575,7 +4566,7 @@
         </p:nvSpPr>
         <p:spPr>
           <a:xfrm>
-            <a:off x="6228314" y="3976383"/>
+            <a:off x="6228314" y="4144163"/>
             <a:ext cx="1295400" cy="1981200"/>
           </a:xfrm>
           <a:prstGeom prst="rect">
@@ -4618,7 +4609,7 @@
         </p:nvSpPr>
         <p:spPr>
           <a:xfrm>
-            <a:off x="6228314" y="3607051"/>
+            <a:off x="6228314" y="3774831"/>
             <a:ext cx="1221809" cy="369332"/>
           </a:xfrm>
           <a:prstGeom prst="rect">
@@ -4676,7 +4667,7 @@
         </p:nvSpPr>
         <p:spPr>
           <a:xfrm>
-            <a:off x="3881834" y="3998148"/>
+            <a:off x="3881834" y="4165928"/>
             <a:ext cx="1295400" cy="1981200"/>
           </a:xfrm>
           <a:prstGeom prst="rect">
@@ -4719,7 +4710,7 @@
         </p:nvSpPr>
         <p:spPr>
           <a:xfrm>
-            <a:off x="3851360" y="3628816"/>
+            <a:off x="3851360" y="3796596"/>
             <a:ext cx="1221809" cy="369332"/>
           </a:xfrm>
           <a:prstGeom prst="rect">
@@ -4749,7 +4740,7 @@
         </p:nvSpPr>
         <p:spPr>
           <a:xfrm>
-            <a:off x="4013974" y="3148510"/>
+            <a:off x="4013974" y="3316290"/>
             <a:ext cx="1964449" cy="369332"/>
           </a:xfrm>
           <a:prstGeom prst="rect">
@@ -4779,7 +4770,7 @@
         </p:nvSpPr>
         <p:spPr>
           <a:xfrm>
-            <a:off x="5492024" y="4740092"/>
+            <a:off x="5492024" y="4907872"/>
             <a:ext cx="415498" cy="369332"/>
           </a:xfrm>
           <a:prstGeom prst="rect">
@@ -4801,59 +4792,104 @@
           </a:p>
         </p:txBody>
       </p:sp>
-      <p:sp>
-        <p:nvSpPr>
-          <p:cNvPr id="19" name="Rectangle 18"/>
-          <p:cNvSpPr/>
+      <p:grpSp>
+        <p:nvGrpSpPr>
+          <p:cNvPr id="23" name="Group 22"/>
+          <p:cNvGrpSpPr/>
           <p:nvPr/>
-        </p:nvSpPr>
-        <p:spPr>
-          <a:xfrm rot="16200000">
-            <a:off x="3850776" y="1056488"/>
-            <a:ext cx="955997" cy="1981200"/>
-          </a:xfrm>
-          <a:prstGeom prst="rect">
-            <a:avLst/>
-          </a:prstGeom>
-          <a:solidFill>
-            <a:schemeClr val="bg1"/>
-          </a:solidFill>
-        </p:spPr>
-        <p:style>
-          <a:lnRef idx="2">
-            <a:schemeClr val="accent1">
-              <a:shade val="50000"/>
-            </a:schemeClr>
-          </a:lnRef>
-          <a:fillRef idx="1">
-            <a:schemeClr val="accent1"/>
-          </a:fillRef>
-          <a:effectRef idx="0">
-            <a:schemeClr val="accent1"/>
-          </a:effectRef>
-          <a:fontRef idx="minor">
-            <a:schemeClr val="lt1"/>
-          </a:fontRef>
-        </p:style>
-        <p:txBody>
-          <a:bodyPr rtlCol="0" anchor="ctr"/>
-          <a:lstStyle/>
-          <a:p>
-            <a:pPr algn="ctr"/>
-            <a:endParaRPr lang="en-US" dirty="0"/>
-          </a:p>
-        </p:txBody>
-      </p:sp>
-      <p:sp>
-        <p:nvSpPr>
-          <p:cNvPr id="20" name="TextBox 19"/>
+        </p:nvGrpSpPr>
+        <p:grpSpPr>
+          <a:xfrm>
+            <a:off x="896979" y="1443254"/>
+            <a:ext cx="1981200" cy="955997"/>
+            <a:chOff x="3338175" y="1569089"/>
+            <a:chExt cx="1981200" cy="955997"/>
+          </a:xfrm>
+        </p:grpSpPr>
+        <p:sp>
+          <p:nvSpPr>
+            <p:cNvPr id="19" name="Rectangle 18"/>
+            <p:cNvSpPr/>
+            <p:nvPr/>
+          </p:nvSpPr>
+          <p:spPr>
+            <a:xfrm rot="16200000">
+              <a:off x="3850776" y="1056488"/>
+              <a:ext cx="955997" cy="1981200"/>
+            </a:xfrm>
+            <a:prstGeom prst="rect">
+              <a:avLst/>
+            </a:prstGeom>
+            <a:solidFill>
+              <a:schemeClr val="bg1"/>
+            </a:solidFill>
+          </p:spPr>
+          <p:style>
+            <a:lnRef idx="2">
+              <a:schemeClr val="accent1">
+                <a:shade val="50000"/>
+              </a:schemeClr>
+            </a:lnRef>
+            <a:fillRef idx="1">
+              <a:schemeClr val="accent1"/>
+            </a:fillRef>
+            <a:effectRef idx="0">
+              <a:schemeClr val="accent1"/>
+            </a:effectRef>
+            <a:fontRef idx="minor">
+              <a:schemeClr val="lt1"/>
+            </a:fontRef>
+          </p:style>
+          <p:txBody>
+            <a:bodyPr rtlCol="0" anchor="ctr"/>
+            <a:lstStyle/>
+            <a:p>
+              <a:pPr algn="ctr"/>
+              <a:endParaRPr lang="en-US" dirty="0"/>
+            </a:p>
+          </p:txBody>
+        </p:sp>
+        <p:sp>
+          <p:nvSpPr>
+            <p:cNvPr id="20" name="TextBox 19"/>
+            <p:cNvSpPr txBox="1"/>
+            <p:nvPr/>
+          </p:nvSpPr>
+          <p:spPr>
+            <a:xfrm>
+              <a:off x="3621089" y="1849613"/>
+              <a:ext cx="1280094" cy="369332"/>
+            </a:xfrm>
+            <a:prstGeom prst="rect">
+              <a:avLst/>
+            </a:prstGeom>
+            <a:noFill/>
+          </p:spPr>
+          <p:txBody>
+            <a:bodyPr wrap="none" rtlCol="0">
+              <a:spAutoFit/>
+            </a:bodyPr>
+            <a:lstStyle/>
+            <a:p>
+              <a:r>
+                <a:rPr lang="en-US" dirty="0" smtClean="0"/>
+                <a:t>Docker Hub</a:t>
+              </a:r>
+              <a:endParaRPr lang="en-US" dirty="0"/>
+            </a:p>
+          </p:txBody>
+        </p:sp>
+      </p:grpSp>
+      <p:sp>
+        <p:nvSpPr>
+          <p:cNvPr id="22" name="TextBox 21"/>
           <p:cNvSpPr txBox="1"/>
           <p:nvPr/>
         </p:nvSpPr>
         <p:spPr>
           <a:xfrm>
-            <a:off x="3621089" y="1849613"/>
-            <a:ext cx="1280094" cy="369332"/>
+            <a:off x="332605" y="2915016"/>
+            <a:ext cx="1021370" cy="369332"/>
           </a:xfrm>
           <a:prstGeom prst="rect">
             <a:avLst/>
@@ -4868,42 +4904,188 @@
           <a:p>
             <a:r>
               <a:rPr lang="en-US" dirty="0" smtClean="0"/>
-              <a:t>Docker Hub</a:t>
-            </a:r>
-            <a:endParaRPr lang="en-US" dirty="0"/>
-          </a:p>
-        </p:txBody>
-      </p:sp>
-      <p:sp>
-        <p:nvSpPr>
-          <p:cNvPr id="22" name="TextBox 21"/>
-          <p:cNvSpPr txBox="1"/>
+              <a:t>AWS EC2</a:t>
+            </a:r>
+            <a:endParaRPr lang="en-US" dirty="0"/>
+          </a:p>
+        </p:txBody>
+      </p:sp>
+      <p:grpSp>
+        <p:nvGrpSpPr>
+          <p:cNvPr id="28" name="Group 27"/>
+          <p:cNvGrpSpPr/>
           <p:nvPr/>
-        </p:nvSpPr>
-        <p:spPr>
-          <a:xfrm>
-            <a:off x="4032150" y="2680124"/>
-            <a:ext cx="618503" cy="369332"/>
-          </a:xfrm>
-          <a:prstGeom prst="rect">
-            <a:avLst/>
-          </a:prstGeom>
-          <a:noFill/>
-        </p:spPr>
-        <p:txBody>
-          <a:bodyPr wrap="none" rtlCol="0">
-            <a:spAutoFit/>
-          </a:bodyPr>
-          <a:lstStyle/>
-          <a:p>
-            <a:r>
-              <a:rPr lang="en-US" dirty="0" smtClean="0"/>
-              <a:t>AWS</a:t>
-            </a:r>
-            <a:endParaRPr lang="en-US" dirty="0"/>
-          </a:p>
-        </p:txBody>
-      </p:sp>
+        </p:nvGrpSpPr>
+        <p:grpSpPr>
+          <a:xfrm>
+            <a:off x="5839496" y="1453041"/>
+            <a:ext cx="1981200" cy="955997"/>
+            <a:chOff x="4983818" y="1453041"/>
+            <a:chExt cx="1981200" cy="955997"/>
+          </a:xfrm>
+        </p:grpSpPr>
+        <p:sp>
+          <p:nvSpPr>
+            <p:cNvPr id="26" name="Rectangle 25"/>
+            <p:cNvSpPr/>
+            <p:nvPr/>
+          </p:nvSpPr>
+          <p:spPr>
+            <a:xfrm rot="16200000">
+              <a:off x="5496419" y="940440"/>
+              <a:ext cx="955997" cy="1981200"/>
+            </a:xfrm>
+            <a:prstGeom prst="rect">
+              <a:avLst/>
+            </a:prstGeom>
+            <a:solidFill>
+              <a:schemeClr val="bg1"/>
+            </a:solidFill>
+          </p:spPr>
+          <p:style>
+            <a:lnRef idx="2">
+              <a:schemeClr val="accent1">
+                <a:shade val="50000"/>
+              </a:schemeClr>
+            </a:lnRef>
+            <a:fillRef idx="1">
+              <a:schemeClr val="accent1"/>
+            </a:fillRef>
+            <a:effectRef idx="0">
+              <a:schemeClr val="accent1"/>
+            </a:effectRef>
+            <a:fontRef idx="minor">
+              <a:schemeClr val="lt1"/>
+            </a:fontRef>
+          </p:style>
+          <p:txBody>
+            <a:bodyPr rtlCol="0" anchor="ctr"/>
+            <a:lstStyle/>
+            <a:p>
+              <a:pPr algn="ctr"/>
+              <a:endParaRPr lang="en-US" dirty="0"/>
+            </a:p>
+          </p:txBody>
+        </p:sp>
+        <p:sp>
+          <p:nvSpPr>
+            <p:cNvPr id="27" name="TextBox 26"/>
+            <p:cNvSpPr txBox="1"/>
+            <p:nvPr/>
+          </p:nvSpPr>
+          <p:spPr>
+            <a:xfrm>
+              <a:off x="5216397" y="1733565"/>
+              <a:ext cx="1549655" cy="369332"/>
+            </a:xfrm>
+            <a:prstGeom prst="rect">
+              <a:avLst/>
+            </a:prstGeom>
+            <a:noFill/>
+          </p:spPr>
+          <p:txBody>
+            <a:bodyPr wrap="none" rtlCol="0">
+              <a:spAutoFit/>
+            </a:bodyPr>
+            <a:lstStyle/>
+            <a:p>
+              <a:r>
+                <a:rPr lang="en-US" dirty="0" smtClean="0"/>
+                <a:t>Client Browser</a:t>
+              </a:r>
+              <a:endParaRPr lang="en-US" dirty="0"/>
+            </a:p>
+          </p:txBody>
+        </p:sp>
+      </p:grpSp>
+      <p:grpSp>
+        <p:nvGrpSpPr>
+          <p:cNvPr id="31" name="Group 30"/>
+          <p:cNvGrpSpPr/>
+          <p:nvPr/>
+        </p:nvGrpSpPr>
+        <p:grpSpPr>
+          <a:xfrm>
+            <a:off x="3674379" y="2734138"/>
+            <a:ext cx="2541864" cy="512402"/>
+            <a:chOff x="3171039" y="2734138"/>
+            <a:chExt cx="2541864" cy="512402"/>
+          </a:xfrm>
+        </p:grpSpPr>
+        <p:sp>
+          <p:nvSpPr>
+            <p:cNvPr id="29" name="Rectangle 28"/>
+            <p:cNvSpPr/>
+            <p:nvPr/>
+          </p:nvSpPr>
+          <p:spPr>
+            <a:xfrm>
+              <a:off x="3171039" y="2734138"/>
+              <a:ext cx="2541864" cy="512402"/>
+            </a:xfrm>
+            <a:prstGeom prst="rect">
+              <a:avLst/>
+            </a:prstGeom>
+            <a:solidFill>
+              <a:schemeClr val="bg2"/>
+            </a:solidFill>
+          </p:spPr>
+          <p:style>
+            <a:lnRef idx="2">
+              <a:schemeClr val="accent1">
+                <a:shade val="50000"/>
+              </a:schemeClr>
+            </a:lnRef>
+            <a:fillRef idx="1">
+              <a:schemeClr val="accent1"/>
+            </a:fillRef>
+            <a:effectRef idx="0">
+              <a:schemeClr val="accent1"/>
+            </a:effectRef>
+            <a:fontRef idx="minor">
+              <a:schemeClr val="lt1"/>
+            </a:fontRef>
+          </p:style>
+          <p:txBody>
+            <a:bodyPr rtlCol="0" anchor="ctr"/>
+            <a:lstStyle/>
+            <a:p>
+              <a:pPr algn="ctr"/>
+              <a:endParaRPr lang="en-US" dirty="0"/>
+            </a:p>
+          </p:txBody>
+        </p:sp>
+        <p:sp>
+          <p:nvSpPr>
+            <p:cNvPr id="30" name="TextBox 29"/>
+            <p:cNvSpPr txBox="1"/>
+            <p:nvPr/>
+          </p:nvSpPr>
+          <p:spPr>
+            <a:xfrm>
+              <a:off x="3537199" y="2805959"/>
+              <a:ext cx="1906804" cy="369332"/>
+            </a:xfrm>
+            <a:prstGeom prst="rect">
+              <a:avLst/>
+            </a:prstGeom>
+            <a:noFill/>
+          </p:spPr>
+          <p:txBody>
+            <a:bodyPr wrap="none" rtlCol="0">
+              <a:spAutoFit/>
+            </a:bodyPr>
+            <a:lstStyle/>
+            <a:p>
+              <a:r>
+                <a:rPr lang="en-US" dirty="0" smtClean="0"/>
+                <a:t>EC2 Load Balancer</a:t>
+              </a:r>
+              <a:endParaRPr lang="en-US" dirty="0"/>
+            </a:p>
+          </p:txBody>
+        </p:sp>
+      </p:grpSp>
     </p:spTree>
   </p:cSld>
   <p:clrMapOvr>
@@ -5007,8 +5189,25 @@
           <a:p>
             <a:r>
               <a:rPr lang="en-US" dirty="0" smtClean="0"/>
-              <a:t>The k8s-console is not part of the cluster it’s used to configure the cluster and run kubectl commands only.</a:t>
-            </a:r>
+              <a:t>The k8s-console is not part of the cluster it’s used to </a:t>
+            </a:r>
+            <a:r>
+              <a:rPr lang="en-US" dirty="0" smtClean="0"/>
+              <a:t>strictly to configure </a:t>
+            </a:r>
+            <a:r>
+              <a:rPr lang="en-US" dirty="0" smtClean="0"/>
+              <a:t>the cluster and run </a:t>
+            </a:r>
+            <a:r>
+              <a:rPr lang="en-US" smtClean="0"/>
+              <a:t>kubectl </a:t>
+            </a:r>
+            <a:r>
+              <a:rPr lang="en-US" smtClean="0"/>
+              <a:t>commands.</a:t>
+            </a:r>
+            <a:endParaRPr lang="en-US" dirty="0" smtClean="0"/>
           </a:p>
           <a:p>
             <a:endParaRPr lang="en-US" dirty="0" smtClean="0"/>
@@ -5037,11 +5236,7 @@
           <a:p>
             <a:r>
               <a:rPr lang="en-US" dirty="0" smtClean="0"/>
-              <a:t>export </a:t>
-            </a:r>
-            <a:r>
-              <a:rPr lang="en-US" dirty="0" smtClean="0"/>
-              <a:t>NUM_NODES=2</a:t>
+              <a:t>export NUM_NODES=2</a:t>
             </a:r>
           </a:p>
           <a:p>
@@ -5077,11 +5272,7 @@
           <a:p>
             <a:r>
               <a:rPr lang="en-US" dirty="0" smtClean="0"/>
-              <a:t>export </a:t>
-            </a:r>
-            <a:r>
-              <a:rPr lang="en-US" dirty="0" smtClean="0"/>
-              <a:t>KUBERNETES_PROVIDER=aws</a:t>
+              <a:t>export KUBERNETES_PROVIDER=aws</a:t>
             </a:r>
           </a:p>
           <a:p>
@@ -5096,11 +5287,7 @@
           <a:p>
             <a:r>
               <a:rPr lang="en-US" dirty="0" smtClean="0"/>
-              <a:t>curl </a:t>
-            </a:r>
-            <a:r>
-              <a:rPr lang="en-US" dirty="0" smtClean="0"/>
-              <a:t>-</a:t>
+              <a:t>curl -</a:t>
             </a:r>
             <a:r>
               <a:rPr lang="en-US" dirty="0" err="1" smtClean="0"/>
@@ -5108,13 +5295,8 @@
             </a:r>
             <a:r>
               <a:rPr lang="en-US" dirty="0" smtClean="0"/>
-              <a:t> https://</a:t>
-            </a:r>
-            <a:r>
-              <a:rPr lang="en-US" dirty="0" smtClean="0"/>
-              <a:t>get.k8s.io | bash</a:t>
-            </a:r>
-            <a:endParaRPr lang="en-US" dirty="0" smtClean="0"/>
+              <a:t> https://get.k8s.io | bash</a:t>
+            </a:r>
           </a:p>
         </p:txBody>
       </p:sp>
@@ -5238,15 +5420,7 @@
             </a:pPr>
             <a:r>
               <a:rPr lang="en-US" dirty="0" smtClean="0"/>
-              <a:t> </a:t>
-            </a:r>
-            <a:r>
-              <a:rPr lang="en-US" dirty="0" smtClean="0"/>
-              <a:t> </a:t>
-            </a:r>
-            <a:r>
-              <a:rPr lang="en-US" dirty="0" smtClean="0"/>
-              <a:t>Create a simple web container using Docker and push to Docker Hub</a:t>
+              <a:t>  Create a simple web container using Docker and push to Docker Hub</a:t>
             </a:r>
           </a:p>
           <a:p>
@@ -5276,13 +5450,8 @@
             </a:pPr>
             <a:r>
               <a:rPr lang="en-US" dirty="0" smtClean="0"/>
-              <a:t> </a:t>
-            </a:r>
-            <a:r>
-              <a:rPr lang="en-US" dirty="0" smtClean="0"/>
-              <a:t> Test using browser</a:t>
-            </a:r>
-            <a:endParaRPr lang="en-US" dirty="0" smtClean="0"/>
+              <a:t>  Test using browser</a:t>
+            </a:r>
           </a:p>
         </p:txBody>
       </p:sp>

</xml_diff>

<commit_message>
Title Change and some minor verbage
</commit_message>
<xml_diff>
--- a/docs/Kubernetes-on-AWS-Presentation.pptx
+++ b/docs/Kubernetes-on-AWS-Presentation.pptx
@@ -204,7 +204,7 @@
             <a:fld id="{814910AB-AEF0-414C-82CB-791080B1186B}" type="datetimeFigureOut">
               <a:rPr lang="en-US" smtClean="0"/>
               <a:pPr/>
-              <a:t>9/4/2016</a:t>
+              <a:t>9/6/2016</a:t>
             </a:fld>
             <a:endParaRPr lang="en-US" dirty="0"/>
           </a:p>
@@ -366,7 +366,7 @@
             <a:fld id="{5B4AE38D-E020-46F3-803D-8636C5B7B74E}" type="datetimeFigureOut">
               <a:rPr lang="en-US" smtClean="0"/>
               <a:pPr/>
-              <a:t>9/4/2016</a:t>
+              <a:t>9/6/2016</a:t>
             </a:fld>
             <a:endParaRPr lang="en-US" dirty="0"/>
           </a:p>
@@ -939,7 +939,7 @@
             <a:fld id="{7DDB771E-4AED-4DD3-8AA1-5D9FD2224F14}" type="datetimeFigureOut">
               <a:rPr lang="en-US" smtClean="0"/>
               <a:pPr/>
-              <a:t>9/4/2016</a:t>
+              <a:t>9/6/2016</a:t>
             </a:fld>
             <a:endParaRPr lang="en-US" dirty="0"/>
           </a:p>
@@ -1106,7 +1106,7 @@
             <a:fld id="{7DDB771E-4AED-4DD3-8AA1-5D9FD2224F14}" type="datetimeFigureOut">
               <a:rPr lang="en-US" smtClean="0"/>
               <a:pPr/>
-              <a:t>9/4/2016</a:t>
+              <a:t>9/6/2016</a:t>
             </a:fld>
             <a:endParaRPr lang="en-US" dirty="0"/>
           </a:p>
@@ -1283,7 +1283,7 @@
             <a:fld id="{7DDB771E-4AED-4DD3-8AA1-5D9FD2224F14}" type="datetimeFigureOut">
               <a:rPr lang="en-US" smtClean="0"/>
               <a:pPr/>
-              <a:t>9/4/2016</a:t>
+              <a:t>9/6/2016</a:t>
             </a:fld>
             <a:endParaRPr lang="en-US" dirty="0"/>
           </a:p>
@@ -1450,7 +1450,7 @@
             <a:fld id="{7DDB771E-4AED-4DD3-8AA1-5D9FD2224F14}" type="datetimeFigureOut">
               <a:rPr lang="en-US" smtClean="0"/>
               <a:pPr/>
-              <a:t>9/4/2016</a:t>
+              <a:t>9/6/2016</a:t>
             </a:fld>
             <a:endParaRPr lang="en-US" dirty="0"/>
           </a:p>
@@ -1693,7 +1693,7 @@
             <a:fld id="{7DDB771E-4AED-4DD3-8AA1-5D9FD2224F14}" type="datetimeFigureOut">
               <a:rPr lang="en-US" smtClean="0"/>
               <a:pPr/>
-              <a:t>9/4/2016</a:t>
+              <a:t>9/6/2016</a:t>
             </a:fld>
             <a:endParaRPr lang="en-US" dirty="0"/>
           </a:p>
@@ -1978,7 +1978,7 @@
             <a:fld id="{7DDB771E-4AED-4DD3-8AA1-5D9FD2224F14}" type="datetimeFigureOut">
               <a:rPr lang="en-US" smtClean="0"/>
               <a:pPr/>
-              <a:t>9/4/2016</a:t>
+              <a:t>9/6/2016</a:t>
             </a:fld>
             <a:endParaRPr lang="en-US" dirty="0"/>
           </a:p>
@@ -2397,7 +2397,7 @@
             <a:fld id="{7DDB771E-4AED-4DD3-8AA1-5D9FD2224F14}" type="datetimeFigureOut">
               <a:rPr lang="en-US" smtClean="0"/>
               <a:pPr/>
-              <a:t>9/4/2016</a:t>
+              <a:t>9/6/2016</a:t>
             </a:fld>
             <a:endParaRPr lang="en-US" dirty="0"/>
           </a:p>
@@ -2512,7 +2512,7 @@
             <a:fld id="{7DDB771E-4AED-4DD3-8AA1-5D9FD2224F14}" type="datetimeFigureOut">
               <a:rPr lang="en-US" smtClean="0"/>
               <a:pPr/>
-              <a:t>9/4/2016</a:t>
+              <a:t>9/6/2016</a:t>
             </a:fld>
             <a:endParaRPr lang="en-US" dirty="0"/>
           </a:p>
@@ -2604,7 +2604,7 @@
             <a:fld id="{7DDB771E-4AED-4DD3-8AA1-5D9FD2224F14}" type="datetimeFigureOut">
               <a:rPr lang="en-US" smtClean="0"/>
               <a:pPr/>
-              <a:t>9/4/2016</a:t>
+              <a:t>9/6/2016</a:t>
             </a:fld>
             <a:endParaRPr lang="en-US" dirty="0"/>
           </a:p>
@@ -2878,7 +2878,7 @@
             <a:fld id="{7DDB771E-4AED-4DD3-8AA1-5D9FD2224F14}" type="datetimeFigureOut">
               <a:rPr lang="en-US" smtClean="0"/>
               <a:pPr/>
-              <a:t>9/4/2016</a:t>
+              <a:t>9/6/2016</a:t>
             </a:fld>
             <a:endParaRPr lang="en-US" dirty="0"/>
           </a:p>
@@ -3128,7 +3128,7 @@
             <a:fld id="{7DDB771E-4AED-4DD3-8AA1-5D9FD2224F14}" type="datetimeFigureOut">
               <a:rPr lang="en-US" smtClean="0"/>
               <a:pPr/>
-              <a:t>9/4/2016</a:t>
+              <a:t>9/6/2016</a:t>
             </a:fld>
             <a:endParaRPr lang="en-US" dirty="0"/>
           </a:p>
@@ -3338,7 +3338,7 @@
             <a:fld id="{7DDB771E-4AED-4DD3-8AA1-5D9FD2224F14}" type="datetimeFigureOut">
               <a:rPr lang="en-US" smtClean="0"/>
               <a:pPr/>
-              <a:t>9/4/2016</a:t>
+              <a:t>9/6/2016</a:t>
             </a:fld>
             <a:endParaRPr lang="en-US" dirty="0"/>
           </a:p>
@@ -3781,8 +3781,8 @@
         </p:nvSpPr>
         <p:spPr>
           <a:xfrm>
-            <a:off x="2208672" y="612395"/>
-            <a:ext cx="4720634" cy="746201"/>
+            <a:off x="1610687" y="738230"/>
+            <a:ext cx="5704513" cy="746201"/>
           </a:xfrm>
           <a:prstGeom prst="rect">
             <a:avLst/>
@@ -3790,11 +3790,11 @@
         </p:spPr>
         <p:txBody>
           <a:bodyPr anchor="b">
-            <a:normAutofit lnSpcReduction="10000"/>
+            <a:normAutofit fontScale="55000" lnSpcReduction="20000"/>
           </a:bodyPr>
           <a:lstStyle/>
           <a:p>
-            <a:pPr marL="0" marR="0" lvl="0" indent="0" algn="l" defTabSz="914400" rtl="0" eaLnBrk="1" fontAlgn="auto" latinLnBrk="0" hangingPunct="1">
+            <a:pPr marL="0" marR="0" lvl="0" indent="0" algn="ctr" defTabSz="914400" rtl="0" eaLnBrk="1" fontAlgn="auto" latinLnBrk="0" hangingPunct="1">
               <a:lnSpc>
                 <a:spcPct val="100000"/>
               </a:lnSpc>
@@ -3829,7 +3829,47 @@
                 <a:ea typeface="+mj-ea"/>
                 <a:cs typeface="+mj-cs"/>
               </a:rPr>
-              <a:t>Kubernetes on AWS</a:t>
+              <a:t>Docker and Kubernetes </a:t>
+            </a:r>
+            <a:r>
+              <a:rPr lang="en-US" sz="4300" dirty="0" smtClean="0">
+                <a:solidFill>
+                  <a:schemeClr val="tx2">
+                    <a:satMod val="130000"/>
+                  </a:schemeClr>
+                </a:solidFill>
+                <a:effectLst>
+                  <a:outerShdw blurRad="50000" dist="30000" dir="5400000" algn="tl" rotWithShape="0">
+                    <a:srgbClr val="000000">
+                      <a:alpha val="30000"/>
+                    </a:srgbClr>
+                  </a:outerShdw>
+                </a:effectLst>
+                <a:latin typeface="+mj-lt"/>
+                <a:ea typeface="+mj-ea"/>
+                <a:cs typeface="+mj-cs"/>
+              </a:rPr>
+              <a:t>on </a:t>
+            </a:r>
+            <a:r>
+              <a:rPr lang="en-US" sz="4300" dirty="0" smtClean="0">
+                <a:solidFill>
+                  <a:schemeClr val="tx2">
+                    <a:satMod val="130000"/>
+                  </a:schemeClr>
+                </a:solidFill>
+                <a:effectLst>
+                  <a:outerShdw blurRad="50000" dist="30000" dir="5400000" algn="tl" rotWithShape="0">
+                    <a:srgbClr val="000000">
+                      <a:alpha val="30000"/>
+                    </a:srgbClr>
+                  </a:outerShdw>
+                </a:effectLst>
+                <a:latin typeface="+mj-lt"/>
+                <a:ea typeface="+mj-ea"/>
+                <a:cs typeface="+mj-cs"/>
+              </a:rPr>
+              <a:t>AWS QuickStart</a:t>
             </a:r>
             <a:endParaRPr kumimoji="0" lang="en-US" sz="4300" b="0" i="0" u="none" strike="noStrike" kern="1200" cap="none" spc="0" normalizeH="0" baseline="0" noProof="0" dirty="0">
               <a:ln>
@@ -5189,23 +5229,11 @@
           <a:p>
             <a:r>
               <a:rPr lang="en-US" dirty="0" smtClean="0"/>
-              <a:t>The k8s-console is not part of the cluster it’s used to </a:t>
-            </a:r>
-            <a:r>
-              <a:rPr lang="en-US" dirty="0" smtClean="0"/>
-              <a:t>strictly to configure </a:t>
-            </a:r>
-            <a:r>
-              <a:rPr lang="en-US" dirty="0" smtClean="0"/>
-              <a:t>the cluster and run </a:t>
-            </a:r>
-            <a:r>
-              <a:rPr lang="en-US" smtClean="0"/>
-              <a:t>kubectl </a:t>
-            </a:r>
-            <a:r>
-              <a:rPr lang="en-US" smtClean="0"/>
-              <a:t>commands.</a:t>
+              <a:t>The k8s-console is not part of the cluster it’s used to strictly to configure the cluster and run </a:t>
+            </a:r>
+            <a:r>
+              <a:rPr lang="en-US" smtClean="0"/>
+              <a:t>kubectl commands.</a:t>
             </a:r>
             <a:endParaRPr lang="en-US" dirty="0" smtClean="0"/>
           </a:p>
@@ -5400,8 +5428,13 @@
             </a:pPr>
             <a:r>
               <a:rPr lang="en-US" dirty="0" smtClean="0"/>
-              <a:t>  To save time the k8s-console and kubernetes cluster are preconfigured</a:t>
-            </a:r>
+              <a:t>  To save time the k8s-console and kubernetes cluster are </a:t>
+            </a:r>
+            <a:r>
+              <a:rPr lang="en-US" dirty="0" smtClean="0"/>
+              <a:t>already configured</a:t>
+            </a:r>
+            <a:endParaRPr lang="en-US" dirty="0" smtClean="0"/>
           </a:p>
           <a:p>
             <a:pPr>

</xml_diff>